<commit_message>
2160 schedule; several lecture files
</commit_message>
<xml_diff>
--- a/eece3170/lectures/eece.3170_lec17_jump.pptx
+++ b/eece3170/lectures/eece.3170_lec17_jump.pptx
@@ -197,7 +197,7 @@
 <p1510:revInfo xmlns:a="http://schemas.openxmlformats.org/drawingml/2006/main" xmlns:r="http://schemas.openxmlformats.org/officeDocument/2006/relationships" xmlns:p1510="http://schemas.microsoft.com/office/powerpoint/2015/10/main">
   <p1510:revLst>
     <p1510:client id="{9294B226-7278-40F7-B479-2CB17153E9EA}" v="3" dt="2019-10-15T15:32:20.882"/>
-    <p1510:client id="{D8825796-77A1-4568-9762-076A0F9A9AFF}" v="1" dt="2019-10-15T21:36:15.451"/>
+    <p1510:client id="{D8825796-77A1-4568-9762-076A0F9A9AFF}" v="7" dt="2019-10-16T15:30:37.481"/>
   </p1510:revLst>
 </p1510:revInfo>
 </file>
@@ -260,8 +260,8 @@
   </pc:docChgLst>
   <pc:docChgLst>
     <pc:chgData name="Geiger, Michael J" userId="13cae92b-b37c-450b-a449-82fcae19569d" providerId="ADAL" clId="{D8825796-77A1-4568-9762-076A0F9A9AFF}"/>
-    <pc:docChg chg="modSld">
-      <pc:chgData name="Geiger, Michael J" userId="13cae92b-b37c-450b-a449-82fcae19569d" providerId="ADAL" clId="{D8825796-77A1-4568-9762-076A0F9A9AFF}" dt="2019-10-15T21:36:05.724" v="33" actId="20577"/>
+    <pc:docChg chg="undo modSld">
+      <pc:chgData name="Geiger, Michael J" userId="13cae92b-b37c-450b-a449-82fcae19569d" providerId="ADAL" clId="{D8825796-77A1-4568-9762-076A0F9A9AFF}" dt="2019-10-16T15:30:37.481" v="65" actId="20577"/>
       <pc:docMkLst>
         <pc:docMk/>
       </pc:docMkLst>
@@ -292,6 +292,59 @@
             <pc:docMk/>
             <pc:sldMk cId="0" sldId="379"/>
             <ac:spMk id="18435" creationId="{00000000-0000-0000-0000-000000000000}"/>
+          </ac:spMkLst>
+        </pc:spChg>
+      </pc:sldChg>
+      <pc:sldChg chg="modSp">
+        <pc:chgData name="Geiger, Michael J" userId="13cae92b-b37c-450b-a449-82fcae19569d" providerId="ADAL" clId="{D8825796-77A1-4568-9762-076A0F9A9AFF}" dt="2019-10-16T15:19:35.878" v="37" actId="20577"/>
+        <pc:sldMkLst>
+          <pc:docMk/>
+          <pc:sldMk cId="1590944072" sldId="548"/>
+        </pc:sldMkLst>
+        <pc:spChg chg="mod">
+          <ac:chgData name="Geiger, Michael J" userId="13cae92b-b37c-450b-a449-82fcae19569d" providerId="ADAL" clId="{D8825796-77A1-4568-9762-076A0F9A9AFF}" dt="2019-10-16T15:19:35.878" v="37" actId="20577"/>
+          <ac:spMkLst>
+            <pc:docMk/>
+            <pc:sldMk cId="1590944072" sldId="548"/>
+            <ac:spMk id="3" creationId="{00000000-0000-0000-0000-000000000000}"/>
+          </ac:spMkLst>
+        </pc:spChg>
+      </pc:sldChg>
+      <pc:sldChg chg="modSp">
+        <pc:chgData name="Geiger, Michael J" userId="13cae92b-b37c-450b-a449-82fcae19569d" providerId="ADAL" clId="{D8825796-77A1-4568-9762-076A0F9A9AFF}" dt="2019-10-16T15:30:37.481" v="65" actId="20577"/>
+        <pc:sldMkLst>
+          <pc:docMk/>
+          <pc:sldMk cId="2838414892" sldId="552"/>
+        </pc:sldMkLst>
+        <pc:spChg chg="mod">
+          <ac:chgData name="Geiger, Michael J" userId="13cae92b-b37c-450b-a449-82fcae19569d" providerId="ADAL" clId="{D8825796-77A1-4568-9762-076A0F9A9AFF}" dt="2019-10-16T15:30:33.499" v="59" actId="20577"/>
+          <ac:spMkLst>
+            <pc:docMk/>
+            <pc:sldMk cId="2838414892" sldId="552"/>
+            <ac:spMk id="14" creationId="{00000000-0000-0000-0000-000000000000}"/>
+          </ac:spMkLst>
+        </pc:spChg>
+        <pc:spChg chg="mod">
+          <ac:chgData name="Geiger, Michael J" userId="13cae92b-b37c-450b-a449-82fcae19569d" providerId="ADAL" clId="{D8825796-77A1-4568-9762-076A0F9A9AFF}" dt="2019-10-16T15:30:37.481" v="65" actId="20577"/>
+          <ac:spMkLst>
+            <pc:docMk/>
+            <pc:sldMk cId="2838414892" sldId="552"/>
+            <ac:spMk id="15" creationId="{00000000-0000-0000-0000-000000000000}"/>
+          </ac:spMkLst>
+        </pc:spChg>
+      </pc:sldChg>
+      <pc:sldChg chg="modSp">
+        <pc:chgData name="Geiger, Michael J" userId="13cae92b-b37c-450b-a449-82fcae19569d" providerId="ADAL" clId="{D8825796-77A1-4568-9762-076A0F9A9AFF}" dt="2019-10-16T15:21:02.554" v="55" actId="20577"/>
+        <pc:sldMkLst>
+          <pc:docMk/>
+          <pc:sldMk cId="1163098346" sldId="555"/>
+        </pc:sldMkLst>
+        <pc:spChg chg="mod">
+          <ac:chgData name="Geiger, Michael J" userId="13cae92b-b37c-450b-a449-82fcae19569d" providerId="ADAL" clId="{D8825796-77A1-4568-9762-076A0F9A9AFF}" dt="2019-10-16T15:21:02.554" v="55" actId="20577"/>
+          <ac:spMkLst>
+            <pc:docMk/>
+            <pc:sldMk cId="1163098346" sldId="555"/>
+            <ac:spMk id="3" creationId="{00000000-0000-0000-0000-000000000000}"/>
           </ac:spMkLst>
         </pc:spChg>
       </pc:sldChg>
@@ -689,14 +742,14 @@
           </a:ln>
           <a:extLst>
             <a:ext uri="{909E8E84-426E-40dd-AFC4-6F175D3DCCD1}">
-              <a14:hiddenFill xmlns="" xmlns:a14="http://schemas.microsoft.com/office/drawing/2010/main">
+              <a14:hiddenFill xmlns:a14="http://schemas.microsoft.com/office/drawing/2010/main" xmlns="">
                 <a:solidFill>
                   <a:srgbClr val="FFFFFF"/>
                 </a:solidFill>
               </a14:hiddenFill>
             </a:ext>
             <a:ext uri="{FAA26D3D-D897-4be2-8F04-BA451C77F1D7}">
-              <ma14:placeholderFlag xmlns="" xmlns:ma14="http://schemas.microsoft.com/office/mac/drawingml/2011/main" val="1"/>
+              <ma14:placeholderFlag xmlns:ma14="http://schemas.microsoft.com/office/mac/drawingml/2011/main" xmlns="" val="1"/>
             </a:ext>
           </a:extLst>
         </p:spPr>
@@ -1050,14 +1103,14 @@
           <a:ln/>
           <a:extLst>
             <a:ext uri="{909E8E84-426E-40dd-AFC4-6F175D3DCCD1}">
-              <a14:hiddenFill xmlns="" xmlns:a14="http://schemas.microsoft.com/office/drawing/2010/main">
+              <a14:hiddenFill xmlns:a14="http://schemas.microsoft.com/office/drawing/2010/main" xmlns="">
                 <a:solidFill>
                   <a:srgbClr val="FFFFFF"/>
                 </a:solidFill>
               </a14:hiddenFill>
             </a:ext>
             <a:ext uri="{91240B29-F687-4f45-9708-019B960494DF}">
-              <a14:hiddenLine xmlns="" xmlns:a14="http://schemas.microsoft.com/office/drawing/2010/main" w="9525">
+              <a14:hiddenLine xmlns:a14="http://schemas.microsoft.com/office/drawing/2010/main" xmlns="" w="9525">
                 <a:solidFill>
                   <a:srgbClr val="000000"/>
                 </a:solidFill>
@@ -1094,14 +1147,14 @@
           <a:ln/>
           <a:extLst>
             <a:ext uri="{909E8E84-426E-40dd-AFC4-6F175D3DCCD1}">
-              <a14:hiddenFill xmlns="" xmlns:a14="http://schemas.microsoft.com/office/drawing/2010/main">
+              <a14:hiddenFill xmlns:a14="http://schemas.microsoft.com/office/drawing/2010/main" xmlns="">
                 <a:solidFill>
                   <a:srgbClr val="FFFFFF"/>
                 </a:solidFill>
               </a14:hiddenFill>
             </a:ext>
             <a:ext uri="{91240B29-F687-4f45-9708-019B960494DF}">
-              <a14:hiddenLine xmlns="" xmlns:a14="http://schemas.microsoft.com/office/drawing/2010/main" w="9525">
+              <a14:hiddenLine xmlns:a14="http://schemas.microsoft.com/office/drawing/2010/main" xmlns="" w="9525">
                 <a:solidFill>
                   <a:srgbClr val="000000"/>
                 </a:solidFill>
@@ -1280,14 +1333,14 @@
           <a:ln/>
           <a:extLst>
             <a:ext uri="{909E8E84-426E-40dd-AFC4-6F175D3DCCD1}">
-              <a14:hiddenFill xmlns="" xmlns:a14="http://schemas.microsoft.com/office/drawing/2010/main">
+              <a14:hiddenFill xmlns:a14="http://schemas.microsoft.com/office/drawing/2010/main" xmlns="">
                 <a:solidFill>
                   <a:srgbClr val="FFFFFF"/>
                 </a:solidFill>
               </a14:hiddenFill>
             </a:ext>
             <a:ext uri="{91240B29-F687-4f45-9708-019B960494DF}">
-              <a14:hiddenLine xmlns="" xmlns:a14="http://schemas.microsoft.com/office/drawing/2010/main" w="9525">
+              <a14:hiddenLine xmlns:a14="http://schemas.microsoft.com/office/drawing/2010/main" xmlns="" w="9525">
                 <a:solidFill>
                   <a:srgbClr val="000000"/>
                 </a:solidFill>
@@ -1455,14 +1508,14 @@
           <a:ln/>
           <a:extLst>
             <a:ext uri="{909E8E84-426E-40dd-AFC4-6F175D3DCCD1}">
-              <a14:hiddenFill xmlns="" xmlns:a14="http://schemas.microsoft.com/office/drawing/2010/main">
+              <a14:hiddenFill xmlns:a14="http://schemas.microsoft.com/office/drawing/2010/main" xmlns="">
                 <a:solidFill>
                   <a:srgbClr val="FFFFFF"/>
                 </a:solidFill>
               </a14:hiddenFill>
             </a:ext>
             <a:ext uri="{91240B29-F687-4f45-9708-019B960494DF}">
-              <a14:hiddenLine xmlns="" xmlns:a14="http://schemas.microsoft.com/office/drawing/2010/main" w="9525">
+              <a14:hiddenLine xmlns:a14="http://schemas.microsoft.com/office/drawing/2010/main" xmlns="" w="9525">
                 <a:solidFill>
                   <a:srgbClr val="000000"/>
                 </a:solidFill>
@@ -1472,7 +1525,7 @@
               </a14:hiddenLine>
             </a:ext>
             <a:ext uri="{FAA26D3D-D897-4be2-8F04-BA451C77F1D7}">
-              <ma14:placeholderFlag xmlns="" xmlns:ma14="http://schemas.microsoft.com/office/mac/drawingml/2011/main" val="1"/>
+              <ma14:placeholderFlag xmlns:ma14="http://schemas.microsoft.com/office/mac/drawingml/2011/main" xmlns="" val="1"/>
             </a:ext>
           </a:extLst>
         </p:spPr>
@@ -1525,14 +1578,14 @@
           <a:ln/>
           <a:extLst>
             <a:ext uri="{909E8E84-426E-40dd-AFC4-6F175D3DCCD1}">
-              <a14:hiddenFill xmlns="" xmlns:a14="http://schemas.microsoft.com/office/drawing/2010/main">
+              <a14:hiddenFill xmlns:a14="http://schemas.microsoft.com/office/drawing/2010/main" xmlns="">
                 <a:solidFill>
                   <a:srgbClr val="FFFFFF"/>
                 </a:solidFill>
               </a14:hiddenFill>
             </a:ext>
             <a:ext uri="{91240B29-F687-4f45-9708-019B960494DF}">
-              <a14:hiddenLine xmlns="" xmlns:a14="http://schemas.microsoft.com/office/drawing/2010/main" w="9525">
+              <a14:hiddenLine xmlns:a14="http://schemas.microsoft.com/office/drawing/2010/main" xmlns="" w="9525">
                 <a:solidFill>
                   <a:srgbClr val="000000"/>
                 </a:solidFill>
@@ -1665,7 +1718,7 @@
             <a:fld id="{375A26E0-5501-5B4D-A037-7AC60B4062C5}" type="datetime1">
               <a:rPr lang="en-US"/>
               <a:pPr/>
-              <a:t>10/15/2019</a:t>
+              <a:t>10/16/2019</a:t>
             </a:fld>
             <a:endParaRPr lang="en-US"/>
           </a:p>
@@ -1686,14 +1739,14 @@
           <a:ln/>
           <a:extLst>
             <a:ext uri="{909E8E84-426E-40dd-AFC4-6F175D3DCCD1}">
-              <a14:hiddenFill xmlns="" xmlns:a14="http://schemas.microsoft.com/office/drawing/2010/main">
+              <a14:hiddenFill xmlns:a14="http://schemas.microsoft.com/office/drawing/2010/main" xmlns="">
                 <a:solidFill>
                   <a:srgbClr val="FFFFFF"/>
                 </a:solidFill>
               </a14:hiddenFill>
             </a:ext>
             <a:ext uri="{91240B29-F687-4f45-9708-019B960494DF}">
-              <a14:hiddenLine xmlns="" xmlns:a14="http://schemas.microsoft.com/office/drawing/2010/main" w="9525">
+              <a14:hiddenLine xmlns:a14="http://schemas.microsoft.com/office/drawing/2010/main" xmlns="" w="9525">
                 <a:solidFill>
                   <a:srgbClr val="000000"/>
                 </a:solidFill>
@@ -1845,14 +1898,14 @@
           <a:ln/>
           <a:extLst>
             <a:ext uri="{909E8E84-426E-40dd-AFC4-6F175D3DCCD1}">
-              <a14:hiddenFill xmlns="" xmlns:a14="http://schemas.microsoft.com/office/drawing/2010/main">
+              <a14:hiddenFill xmlns:a14="http://schemas.microsoft.com/office/drawing/2010/main" xmlns="">
                 <a:solidFill>
                   <a:srgbClr val="FFFFFF"/>
                 </a:solidFill>
               </a14:hiddenFill>
             </a:ext>
             <a:ext uri="{91240B29-F687-4f45-9708-019B960494DF}">
-              <a14:hiddenLine xmlns="" xmlns:a14="http://schemas.microsoft.com/office/drawing/2010/main" w="9525">
+              <a14:hiddenLine xmlns:a14="http://schemas.microsoft.com/office/drawing/2010/main" xmlns="" w="9525">
                 <a:solidFill>
                   <a:srgbClr val="000000"/>
                 </a:solidFill>
@@ -2037,7 +2090,7 @@
           </a:ln>
           <a:extLst>
             <a:ext uri="{FAA26D3D-D897-4be2-8F04-BA451C77F1D7}">
-              <ma14:placeholderFlag xmlns="" xmlns:ma14="http://schemas.microsoft.com/office/mac/drawingml/2011/main" val="1"/>
+              <ma14:placeholderFlag xmlns:ma14="http://schemas.microsoft.com/office/mac/drawingml/2011/main" xmlns="" val="1"/>
             </a:ext>
           </a:extLst>
         </p:spPr>
@@ -2139,7 +2192,7 @@
           </a:ln>
           <a:extLst>
             <a:ext uri="{909E8E84-426E-40dd-AFC4-6F175D3DCCD1}">
-              <a14:hiddenFill xmlns="" xmlns:a14="http://schemas.microsoft.com/office/drawing/2010/main">
+              <a14:hiddenFill xmlns:a14="http://schemas.microsoft.com/office/drawing/2010/main" xmlns="">
                 <a:solidFill>
                   <a:srgbClr val="FFFFFF"/>
                 </a:solidFill>
@@ -2182,7 +2235,7 @@
           </a:ln>
           <a:extLst>
             <a:ext uri="{909E8E84-426E-40dd-AFC4-6F175D3DCCD1}">
-              <a14:hiddenFill xmlns="" xmlns:a14="http://schemas.microsoft.com/office/drawing/2010/main">
+              <a14:hiddenFill xmlns:a14="http://schemas.microsoft.com/office/drawing/2010/main" xmlns="">
                 <a:noFill/>
               </a14:hiddenFill>
             </a:ext>
@@ -2281,7 +2334,7 @@
           <a:p>
             <a:fld id="{75EAF3A2-9498-4AF8-B816-751F233AA437}" type="datetime1">
               <a:rPr lang="en-US" smtClean="0"/>
-              <a:t>10/15/2019</a:t>
+              <a:t>10/16/2019</a:t>
             </a:fld>
             <a:endParaRPr lang="en-US"/>
           </a:p>
@@ -2475,7 +2528,7 @@
           <a:p>
             <a:fld id="{7901F6C2-49E1-4A1C-A863-532B4CBBAA2B}" type="datetime1">
               <a:rPr lang="en-US" smtClean="0"/>
-              <a:t>10/15/2019</a:t>
+              <a:t>10/16/2019</a:t>
             </a:fld>
             <a:endParaRPr lang="en-US"/>
           </a:p>
@@ -2678,7 +2731,7 @@
           <a:p>
             <a:fld id="{FD914882-637C-477E-B409-24191969C54F}" type="datetime1">
               <a:rPr lang="en-US" smtClean="0"/>
-              <a:t>10/15/2019</a:t>
+              <a:t>10/16/2019</a:t>
             </a:fld>
             <a:endParaRPr lang="en-US"/>
           </a:p>
@@ -2937,7 +2990,7 @@
           <a:p>
             <a:fld id="{E144AFDF-90E5-4C35-BDD8-3D6DCCF684A3}" type="datetime1">
               <a:rPr lang="en-US" smtClean="0"/>
-              <a:t>10/15/2019</a:t>
+              <a:t>10/16/2019</a:t>
             </a:fld>
             <a:endParaRPr lang="en-US"/>
           </a:p>
@@ -3196,7 +3249,7 @@
           <a:p>
             <a:fld id="{CA38DC84-DCBC-4079-8341-B9F646ACEDB7}" type="datetime1">
               <a:rPr lang="en-US" smtClean="0"/>
-              <a:t>10/15/2019</a:t>
+              <a:t>10/16/2019</a:t>
             </a:fld>
             <a:endParaRPr lang="en-US"/>
           </a:p>
@@ -3389,7 +3442,7 @@
           <a:p>
             <a:fld id="{4320FD26-2D59-43C7-BB66-0C7CB2CF01D9}" type="datetime1">
               <a:rPr lang="en-US" smtClean="0"/>
-              <a:t>10/15/2019</a:t>
+              <a:t>10/16/2019</a:t>
             </a:fld>
             <a:endParaRPr lang="en-US"/>
           </a:p>
@@ -3605,7 +3658,7 @@
           <a:p>
             <a:fld id="{C94D215E-EBFB-49C4-8E11-F49DCA06B9C6}" type="datetime1">
               <a:rPr lang="en-US" smtClean="0"/>
-              <a:t>10/15/2019</a:t>
+              <a:t>10/16/2019</a:t>
             </a:fld>
             <a:endParaRPr lang="en-US"/>
           </a:p>
@@ -3915,7 +3968,7 @@
           <a:p>
             <a:fld id="{365B1A42-0CEF-44FF-B081-A3747AC2E09B}" type="datetime1">
               <a:rPr lang="en-US" smtClean="0"/>
-              <a:t>10/15/2019</a:t>
+              <a:t>10/16/2019</a:t>
             </a:fld>
             <a:endParaRPr lang="en-US"/>
           </a:p>
@@ -4364,7 +4417,7 @@
           <a:p>
             <a:fld id="{CA56BFD5-A0DA-4718-B5A5-0342155A675D}" type="datetime1">
               <a:rPr lang="en-US" smtClean="0"/>
-              <a:t>10/15/2019</a:t>
+              <a:t>10/16/2019</a:t>
             </a:fld>
             <a:endParaRPr lang="en-US"/>
           </a:p>
@@ -4506,7 +4559,7 @@
           <a:p>
             <a:fld id="{AD1902F7-14ED-4B12-89F1-88C6D9F040A9}" type="datetime1">
               <a:rPr lang="en-US" smtClean="0"/>
-              <a:t>10/15/2019</a:t>
+              <a:t>10/16/2019</a:t>
             </a:fld>
             <a:endParaRPr lang="en-US"/>
           </a:p>
@@ -4626,7 +4679,7 @@
           <a:p>
             <a:fld id="{EE85DAFC-A2CD-4A6D-95F0-9B6974374A18}" type="datetime1">
               <a:rPr lang="en-US" smtClean="0"/>
-              <a:t>10/15/2019</a:t>
+              <a:t>10/16/2019</a:t>
             </a:fld>
             <a:endParaRPr lang="en-US"/>
           </a:p>
@@ -4926,7 +4979,7 @@
           <a:p>
             <a:fld id="{7701DA4D-09CE-46D9-AA36-B2183BFEF315}" type="datetime1">
               <a:rPr lang="en-US" smtClean="0"/>
-              <a:t>10/15/2019</a:t>
+              <a:t>10/16/2019</a:t>
             </a:fld>
             <a:endParaRPr lang="en-US"/>
           </a:p>
@@ -5204,7 +5257,7 @@
           <a:p>
             <a:fld id="{CD3D7CB9-91D8-4E0D-B1E8-7738E3E980CA}" type="datetime1">
               <a:rPr lang="en-US" smtClean="0"/>
-              <a:t>10/15/2019</a:t>
+              <a:t>10/16/2019</a:t>
             </a:fld>
             <a:endParaRPr lang="en-US"/>
           </a:p>
@@ -5333,14 +5386,14 @@
           </a:ln>
           <a:extLst>
             <a:ext uri="{909E8E84-426E-40dd-AFC4-6F175D3DCCD1}">
-              <a14:hiddenFill xmlns="" xmlns:a14="http://schemas.microsoft.com/office/drawing/2010/main">
+              <a14:hiddenFill xmlns:a14="http://schemas.microsoft.com/office/drawing/2010/main" xmlns="">
                 <a:solidFill>
                   <a:srgbClr val="FFFFFF"/>
                 </a:solidFill>
               </a14:hiddenFill>
             </a:ext>
             <a:ext uri="{91240B29-F687-4f45-9708-019B960494DF}">
-              <a14:hiddenLine xmlns="" xmlns:a14="http://schemas.microsoft.com/office/drawing/2010/main" w="9525">
+              <a14:hiddenLine xmlns:a14="http://schemas.microsoft.com/office/drawing/2010/main" xmlns="" w="9525">
                 <a:solidFill>
                   <a:srgbClr val="000000"/>
                 </a:solidFill>
@@ -5350,7 +5403,7 @@
               </a14:hiddenLine>
             </a:ext>
             <a:ext uri="{FAA26D3D-D897-4be2-8F04-BA451C77F1D7}">
-              <ma14:placeholderFlag xmlns="" xmlns:ma14="http://schemas.microsoft.com/office/mac/drawingml/2011/main" val="1"/>
+              <ma14:placeholderFlag xmlns:ma14="http://schemas.microsoft.com/office/mac/drawingml/2011/main" xmlns="" val="1"/>
             </a:ext>
           </a:extLst>
         </p:spPr>
@@ -5394,14 +5447,14 @@
           </a:ln>
           <a:extLst>
             <a:ext uri="{909E8E84-426E-40dd-AFC4-6F175D3DCCD1}">
-              <a14:hiddenFill xmlns="" xmlns:a14="http://schemas.microsoft.com/office/drawing/2010/main">
+              <a14:hiddenFill xmlns:a14="http://schemas.microsoft.com/office/drawing/2010/main" xmlns="">
                 <a:solidFill>
                   <a:srgbClr val="FFFFFF"/>
                 </a:solidFill>
               </a14:hiddenFill>
             </a:ext>
             <a:ext uri="{91240B29-F687-4f45-9708-019B960494DF}">
-              <a14:hiddenLine xmlns="" xmlns:a14="http://schemas.microsoft.com/office/drawing/2010/main" w="9525">
+              <a14:hiddenLine xmlns:a14="http://schemas.microsoft.com/office/drawing/2010/main" xmlns="" w="9525">
                 <a:solidFill>
                   <a:srgbClr val="000000"/>
                 </a:solidFill>
@@ -5411,7 +5464,7 @@
               </a14:hiddenLine>
             </a:ext>
             <a:ext uri="{FAA26D3D-D897-4be2-8F04-BA451C77F1D7}">
-              <ma14:placeholderFlag xmlns="" xmlns:ma14="http://schemas.microsoft.com/office/mac/drawingml/2011/main" val="1"/>
+              <ma14:placeholderFlag xmlns:ma14="http://schemas.microsoft.com/office/mac/drawingml/2011/main" xmlns="" val="1"/>
             </a:ext>
           </a:extLst>
         </p:spPr>
@@ -5502,7 +5555,7 @@
           <a:p>
             <a:fld id="{121355E4-1211-456C-9F16-AF2A976F5CF7}" type="datetime1">
               <a:rPr lang="en-US" smtClean="0"/>
-              <a:t>10/15/2019</a:t>
+              <a:t>10/16/2019</a:t>
             </a:fld>
             <a:endParaRPr lang="en-US"/>
           </a:p>
@@ -5676,7 +5729,7 @@
           </a:ln>
           <a:extLst>
             <a:ext uri="{909E8E84-426E-40dd-AFC4-6F175D3DCCD1}">
-              <a14:hiddenFill xmlns="" xmlns:a14="http://schemas.microsoft.com/office/drawing/2010/main">
+              <a14:hiddenFill xmlns:a14="http://schemas.microsoft.com/office/drawing/2010/main" xmlns="">
                 <a:solidFill>
                   <a:srgbClr val="FFFFFF"/>
                 </a:solidFill>
@@ -5719,7 +5772,7 @@
           </a:ln>
           <a:extLst>
             <a:ext uri="{909E8E84-426E-40dd-AFC4-6F175D3DCCD1}">
-              <a14:hiddenFill xmlns="" xmlns:a14="http://schemas.microsoft.com/office/drawing/2010/main">
+              <a14:hiddenFill xmlns:a14="http://schemas.microsoft.com/office/drawing/2010/main" xmlns="">
                 <a:noFill/>
               </a14:hiddenFill>
             </a:ext>
@@ -6550,14 +6603,14 @@
           <a:ln/>
           <a:extLst>
             <a:ext uri="{909E8E84-426E-40dd-AFC4-6F175D3DCCD1}">
-              <a14:hiddenFill xmlns="" xmlns:a14="http://schemas.microsoft.com/office/drawing/2010/main">
+              <a14:hiddenFill xmlns:a14="http://schemas.microsoft.com/office/drawing/2010/main" xmlns="">
                 <a:solidFill>
                   <a:srgbClr val="FFFFFF"/>
                 </a:solidFill>
               </a14:hiddenFill>
             </a:ext>
             <a:ext uri="{91240B29-F687-4f45-9708-019B960494DF}">
-              <a14:hiddenLine xmlns="" xmlns:a14="http://schemas.microsoft.com/office/drawing/2010/main" w="9525">
+              <a14:hiddenLine xmlns:a14="http://schemas.microsoft.com/office/drawing/2010/main" xmlns="" w="9525">
                 <a:solidFill>
                   <a:srgbClr val="000000"/>
                 </a:solidFill>
@@ -6663,7 +6716,7 @@
               <a:rPr lang="en-US" sz="1200" smtClean="0">
                 <a:latin typeface="Garamond" charset="0"/>
               </a:rPr>
-              <a:t>10/15/2019</a:t>
+              <a:t>10/16/2019</a:t>
             </a:fld>
             <a:endParaRPr lang="en-US" sz="1200">
               <a:latin typeface="Garamond" charset="0"/>
@@ -6711,14 +6764,14 @@
           <a:ln/>
           <a:extLst>
             <a:ext uri="{909E8E84-426E-40dd-AFC4-6F175D3DCCD1}">
-              <a14:hiddenFill xmlns="" xmlns:a14="http://schemas.microsoft.com/office/drawing/2010/main">
+              <a14:hiddenFill xmlns:a14="http://schemas.microsoft.com/office/drawing/2010/main" xmlns="">
                 <a:solidFill>
                   <a:srgbClr val="FFFFFF"/>
                 </a:solidFill>
               </a14:hiddenFill>
             </a:ext>
             <a:ext uri="{91240B29-F687-4f45-9708-019B960494DF}">
-              <a14:hiddenLine xmlns="" xmlns:a14="http://schemas.microsoft.com/office/drawing/2010/main" w="9525">
+              <a14:hiddenLine xmlns:a14="http://schemas.microsoft.com/office/drawing/2010/main" xmlns="" w="9525">
                 <a:solidFill>
                   <a:srgbClr val="000000"/>
                 </a:solidFill>
@@ -7059,14 +7112,14 @@
           <a:ln/>
           <a:extLst>
             <a:ext uri="{909E8E84-426E-40dd-AFC4-6F175D3DCCD1}">
-              <a14:hiddenFill xmlns="" xmlns:a14="http://schemas.microsoft.com/office/drawing/2010/main">
+              <a14:hiddenFill xmlns:a14="http://schemas.microsoft.com/office/drawing/2010/main" xmlns="">
                 <a:solidFill>
                   <a:srgbClr val="FFFFFF"/>
                 </a:solidFill>
               </a14:hiddenFill>
             </a:ext>
             <a:ext uri="{91240B29-F687-4f45-9708-019B960494DF}">
-              <a14:hiddenLine xmlns="" xmlns:a14="http://schemas.microsoft.com/office/drawing/2010/main" w="9525">
+              <a14:hiddenLine xmlns:a14="http://schemas.microsoft.com/office/drawing/2010/main" xmlns="" w="9525">
                 <a:solidFill>
                   <a:srgbClr val="000000"/>
                 </a:solidFill>
@@ -7172,7 +7225,7 @@
               <a:rPr lang="en-US" sz="1200" smtClean="0">
                 <a:latin typeface="Garamond" charset="0"/>
               </a:rPr>
-              <a:t>10/15/2019</a:t>
+              <a:t>10/16/2019</a:t>
             </a:fld>
             <a:endParaRPr lang="en-US" sz="1200">
               <a:latin typeface="Garamond" charset="0"/>
@@ -7220,14 +7273,14 @@
           <a:ln/>
           <a:extLst>
             <a:ext uri="{909E8E84-426E-40dd-AFC4-6F175D3DCCD1}">
-              <a14:hiddenFill xmlns="" xmlns:a14="http://schemas.microsoft.com/office/drawing/2010/main">
+              <a14:hiddenFill xmlns:a14="http://schemas.microsoft.com/office/drawing/2010/main" xmlns="">
                 <a:solidFill>
                   <a:srgbClr val="FFFFFF"/>
                 </a:solidFill>
               </a14:hiddenFill>
             </a:ext>
             <a:ext uri="{91240B29-F687-4f45-9708-019B960494DF}">
-              <a14:hiddenLine xmlns="" xmlns:a14="http://schemas.microsoft.com/office/drawing/2010/main" w="9525">
+              <a14:hiddenLine xmlns:a14="http://schemas.microsoft.com/office/drawing/2010/main" xmlns="" w="9525">
                 <a:solidFill>
                   <a:srgbClr val="000000"/>
                 </a:solidFill>
@@ -7608,14 +7661,14 @@
           <a:ln/>
           <a:extLst>
             <a:ext uri="{909E8E84-426E-40dd-AFC4-6F175D3DCCD1}">
-              <a14:hiddenFill xmlns="" xmlns:a14="http://schemas.microsoft.com/office/drawing/2010/main">
+              <a14:hiddenFill xmlns:a14="http://schemas.microsoft.com/office/drawing/2010/main" xmlns="">
                 <a:solidFill>
                   <a:srgbClr val="FFFFFF"/>
                 </a:solidFill>
               </a14:hiddenFill>
             </a:ext>
             <a:ext uri="{91240B29-F687-4f45-9708-019B960494DF}">
-              <a14:hiddenLine xmlns="" xmlns:a14="http://schemas.microsoft.com/office/drawing/2010/main" w="9525">
+              <a14:hiddenLine xmlns:a14="http://schemas.microsoft.com/office/drawing/2010/main" xmlns="" w="9525">
                 <a:solidFill>
                   <a:srgbClr val="000000"/>
                 </a:solidFill>
@@ -7721,7 +7774,7 @@
               <a:rPr lang="en-US" sz="1200" smtClean="0">
                 <a:latin typeface="Garamond" charset="0"/>
               </a:rPr>
-              <a:t>10/15/2019</a:t>
+              <a:t>10/16/2019</a:t>
             </a:fld>
             <a:endParaRPr lang="en-US" sz="1200">
               <a:latin typeface="Garamond" charset="0"/>
@@ -7769,14 +7822,14 @@
           <a:ln/>
           <a:extLst>
             <a:ext uri="{909E8E84-426E-40dd-AFC4-6F175D3DCCD1}">
-              <a14:hiddenFill xmlns="" xmlns:a14="http://schemas.microsoft.com/office/drawing/2010/main">
+              <a14:hiddenFill xmlns:a14="http://schemas.microsoft.com/office/drawing/2010/main" xmlns="">
                 <a:solidFill>
                   <a:srgbClr val="FFFFFF"/>
                 </a:solidFill>
               </a14:hiddenFill>
             </a:ext>
             <a:ext uri="{91240B29-F687-4f45-9708-019B960494DF}">
-              <a14:hiddenLine xmlns="" xmlns:a14="http://schemas.microsoft.com/office/drawing/2010/main" w="9525">
+              <a14:hiddenLine xmlns:a14="http://schemas.microsoft.com/office/drawing/2010/main" xmlns="" w="9525">
                 <a:solidFill>
                   <a:srgbClr val="000000"/>
                 </a:solidFill>
@@ -8045,14 +8098,14 @@
           <a:ln/>
           <a:extLst>
             <a:ext uri="{909E8E84-426E-40dd-AFC4-6F175D3DCCD1}">
-              <a14:hiddenFill xmlns="" xmlns:a14="http://schemas.microsoft.com/office/drawing/2010/main">
+              <a14:hiddenFill xmlns:a14="http://schemas.microsoft.com/office/drawing/2010/main" xmlns="">
                 <a:solidFill>
                   <a:srgbClr val="FFFFFF"/>
                 </a:solidFill>
               </a14:hiddenFill>
             </a:ext>
             <a:ext uri="{91240B29-F687-4f45-9708-019B960494DF}">
-              <a14:hiddenLine xmlns="" xmlns:a14="http://schemas.microsoft.com/office/drawing/2010/main" w="9525">
+              <a14:hiddenLine xmlns:a14="http://schemas.microsoft.com/office/drawing/2010/main" xmlns="" w="9525">
                 <a:solidFill>
                   <a:srgbClr val="000000"/>
                 </a:solidFill>
@@ -8158,7 +8211,7 @@
               <a:rPr lang="en-US" sz="1200" smtClean="0">
                 <a:latin typeface="Garamond" charset="0"/>
               </a:rPr>
-              <a:t>10/15/2019</a:t>
+              <a:t>10/16/2019</a:t>
             </a:fld>
             <a:endParaRPr lang="en-US" sz="1200">
               <a:latin typeface="Garamond" charset="0"/>
@@ -8206,14 +8259,14 @@
           <a:ln/>
           <a:extLst>
             <a:ext uri="{909E8E84-426E-40dd-AFC4-6F175D3DCCD1}">
-              <a14:hiddenFill xmlns="" xmlns:a14="http://schemas.microsoft.com/office/drawing/2010/main">
+              <a14:hiddenFill xmlns:a14="http://schemas.microsoft.com/office/drawing/2010/main" xmlns="">
                 <a:solidFill>
                   <a:srgbClr val="FFFFFF"/>
                 </a:solidFill>
               </a14:hiddenFill>
             </a:ext>
             <a:ext uri="{91240B29-F687-4f45-9708-019B960494DF}">
-              <a14:hiddenLine xmlns="" xmlns:a14="http://schemas.microsoft.com/office/drawing/2010/main" w="9525">
+              <a14:hiddenLine xmlns:a14="http://schemas.microsoft.com/office/drawing/2010/main" xmlns="" w="9525">
                 <a:solidFill>
                   <a:srgbClr val="000000"/>
                 </a:solidFill>
@@ -8449,7 +8502,7 @@
             </a:pPr>
             <a:r>
               <a:rPr lang="en-US" dirty="0"/>
-              <a:t>MOV	CL, 5</a:t>
+              <a:t>MOV	CX, 5</a:t>
             </a:r>
           </a:p>
           <a:p>
@@ -8471,7 +8524,7 @@
             </a:pPr>
             <a:r>
               <a:rPr lang="en-US" dirty="0"/>
-              <a:t>     DEC	CL</a:t>
+              <a:t>     DEC	CX</a:t>
             </a:r>
           </a:p>
           <a:p>
@@ -8502,14 +8555,14 @@
           <a:ln/>
           <a:extLst>
             <a:ext uri="{909E8E84-426E-40dd-AFC4-6F175D3DCCD1}">
-              <a14:hiddenFill xmlns="" xmlns:a14="http://schemas.microsoft.com/office/drawing/2010/main">
+              <a14:hiddenFill xmlns:a14="http://schemas.microsoft.com/office/drawing/2010/main" xmlns="">
                 <a:solidFill>
                   <a:srgbClr val="FFFFFF"/>
                 </a:solidFill>
               </a14:hiddenFill>
             </a:ext>
             <a:ext uri="{91240B29-F687-4f45-9708-019B960494DF}">
-              <a14:hiddenLine xmlns="" xmlns:a14="http://schemas.microsoft.com/office/drawing/2010/main" w="9525">
+              <a14:hiddenLine xmlns:a14="http://schemas.microsoft.com/office/drawing/2010/main" xmlns="" w="9525">
                 <a:solidFill>
                   <a:srgbClr val="000000"/>
                 </a:solidFill>
@@ -8615,7 +8668,7 @@
               <a:rPr lang="en-US" sz="1200" smtClean="0">
                 <a:latin typeface="Garamond" charset="0"/>
               </a:rPr>
-              <a:t>10/15/2019</a:t>
+              <a:t>10/16/2019</a:t>
             </a:fld>
             <a:endParaRPr lang="en-US" sz="1200">
               <a:latin typeface="Garamond" charset="0"/>
@@ -8663,14 +8716,14 @@
           <a:ln/>
           <a:extLst>
             <a:ext uri="{909E8E84-426E-40dd-AFC4-6F175D3DCCD1}">
-              <a14:hiddenFill xmlns="" xmlns:a14="http://schemas.microsoft.com/office/drawing/2010/main">
+              <a14:hiddenFill xmlns:a14="http://schemas.microsoft.com/office/drawing/2010/main" xmlns="">
                 <a:solidFill>
                   <a:srgbClr val="FFFFFF"/>
                 </a:solidFill>
               </a14:hiddenFill>
             </a:ext>
             <a:ext uri="{91240B29-F687-4f45-9708-019B960494DF}">
-              <a14:hiddenLine xmlns="" xmlns:a14="http://schemas.microsoft.com/office/drawing/2010/main" w="9525">
+              <a14:hiddenLine xmlns:a14="http://schemas.microsoft.com/office/drawing/2010/main" xmlns="" w="9525">
                 <a:solidFill>
                   <a:srgbClr val="000000"/>
                 </a:solidFill>
@@ -8862,7 +8915,7 @@
             </a:pPr>
             <a:r>
               <a:rPr lang="en-US" dirty="0"/>
-              <a:t>MOV	CL, 5	  </a:t>
+              <a:t>MOV	CX, 5	  </a:t>
             </a:r>
             <a:r>
               <a:rPr lang="en-US" dirty="0">
@@ -8871,7 +8924,7 @@
                 </a:solidFill>
                 <a:sym typeface="Wingdings"/>
               </a:rPr>
-              <a:t> CL = 5</a:t>
+              <a:t> CX = 5</a:t>
             </a:r>
             <a:endParaRPr lang="en-US" dirty="0">
               <a:solidFill>
@@ -8908,7 +8961,7 @@
             </a:pPr>
             <a:r>
               <a:rPr lang="en-US" dirty="0"/>
-              <a:t>     DEC	CL	  </a:t>
+              <a:t>     DEC	CX	  </a:t>
             </a:r>
             <a:r>
               <a:rPr lang="en-US" dirty="0">
@@ -8917,7 +8970,7 @@
                 </a:solidFill>
                 <a:sym typeface="Wingdings"/>
               </a:rPr>
-              <a:t> CL: 5  4  3  2    1    0</a:t>
+              <a:t> CX: 5  4  3  2    1    0</a:t>
             </a:r>
             <a:endParaRPr lang="en-US" dirty="0"/>
           </a:p>
@@ -8938,7 +8991,7 @@
                 </a:solidFill>
                 <a:sym typeface="Wingdings"/>
               </a:rPr>
-              <a:t> Jumps to L as long as CL ≠ 0</a:t>
+              <a:t> Jumps to L as long as CX ≠ 0</a:t>
             </a:r>
             <a:endParaRPr lang="en-US" dirty="0"/>
           </a:p>
@@ -8962,7 +9015,7 @@
                 <a:latin typeface="Courier New"/>
                 <a:cs typeface="Courier New"/>
               </a:rPr>
-              <a:t>for (CL = 5; CL != 0; CL--)</a:t>
+              <a:t>for (CX = 5; CX != 0; CX--)</a:t>
             </a:r>
           </a:p>
           <a:p>
@@ -9005,7 +9058,7 @@
           <a:p>
             <a:fld id="{9E59FFD3-0740-4B0F-8806-33C174340ACF}" type="datetime1">
               <a:rPr lang="en-US" smtClean="0"/>
-              <a:t>10/15/2019</a:t>
+              <a:t>10/16/2019</a:t>
             </a:fld>
             <a:endParaRPr lang="en-US"/>
           </a:p>
@@ -9255,14 +9308,14 @@
           <a:ln/>
           <a:extLst>
             <a:ext uri="{909E8E84-426E-40dd-AFC4-6F175D3DCCD1}">
-              <a14:hiddenFill xmlns="" xmlns:a14="http://schemas.microsoft.com/office/drawing/2010/main">
+              <a14:hiddenFill xmlns:a14="http://schemas.microsoft.com/office/drawing/2010/main" xmlns="">
                 <a:solidFill>
                   <a:srgbClr val="FFFFFF"/>
                 </a:solidFill>
               </a14:hiddenFill>
             </a:ext>
             <a:ext uri="{91240B29-F687-4f45-9708-019B960494DF}">
-              <a14:hiddenLine xmlns="" xmlns:a14="http://schemas.microsoft.com/office/drawing/2010/main" w="9525">
+              <a14:hiddenLine xmlns:a14="http://schemas.microsoft.com/office/drawing/2010/main" xmlns="" w="9525">
                 <a:solidFill>
                   <a:srgbClr val="000000"/>
                 </a:solidFill>
@@ -9368,7 +9421,7 @@
               <a:rPr lang="en-US" sz="1200" smtClean="0">
                 <a:latin typeface="Garamond" charset="0"/>
               </a:rPr>
-              <a:t>10/15/2019</a:t>
+              <a:t>10/16/2019</a:t>
             </a:fld>
             <a:endParaRPr lang="en-US" sz="1200">
               <a:latin typeface="Garamond" charset="0"/>
@@ -9416,14 +9469,14 @@
           <a:ln/>
           <a:extLst>
             <a:ext uri="{909E8E84-426E-40dd-AFC4-6F175D3DCCD1}">
-              <a14:hiddenFill xmlns="" xmlns:a14="http://schemas.microsoft.com/office/drawing/2010/main">
+              <a14:hiddenFill xmlns:a14="http://schemas.microsoft.com/office/drawing/2010/main" xmlns="">
                 <a:solidFill>
                   <a:srgbClr val="FFFFFF"/>
                 </a:solidFill>
               </a14:hiddenFill>
             </a:ext>
             <a:ext uri="{91240B29-F687-4f45-9708-019B960494DF}">
-              <a14:hiddenLine xmlns="" xmlns:a14="http://schemas.microsoft.com/office/drawing/2010/main" w="9525">
+              <a14:hiddenLine xmlns:a14="http://schemas.microsoft.com/office/drawing/2010/main" xmlns="" w="9525">
                 <a:solidFill>
                   <a:srgbClr val="000000"/>
                 </a:solidFill>
@@ -9775,7 +9828,7 @@
           <a:p>
             <a:fld id="{65301B59-C93D-45B1-9548-D79B85DBD601}" type="datetime1">
               <a:rPr lang="en-US" smtClean="0"/>
-              <a:t>10/15/2019</a:t>
+              <a:t>10/16/2019</a:t>
             </a:fld>
             <a:endParaRPr lang="en-US"/>
           </a:p>
@@ -10087,14 +10140,14 @@
           <a:ln/>
           <a:extLst>
             <a:ext uri="{909E8E84-426E-40dd-AFC4-6F175D3DCCD1}">
-              <a14:hiddenFill xmlns="" xmlns:a14="http://schemas.microsoft.com/office/drawing/2010/main">
+              <a14:hiddenFill xmlns:a14="http://schemas.microsoft.com/office/drawing/2010/main" xmlns="">
                 <a:solidFill>
                   <a:srgbClr val="FFFFFF"/>
                 </a:solidFill>
               </a14:hiddenFill>
             </a:ext>
             <a:ext uri="{91240B29-F687-4f45-9708-019B960494DF}">
-              <a14:hiddenLine xmlns="" xmlns:a14="http://schemas.microsoft.com/office/drawing/2010/main" w="9525">
+              <a14:hiddenLine xmlns:a14="http://schemas.microsoft.com/office/drawing/2010/main" xmlns="" w="9525">
                 <a:solidFill>
                   <a:srgbClr val="000000"/>
                 </a:solidFill>
@@ -10200,7 +10253,7 @@
               <a:rPr lang="en-US" sz="1200" smtClean="0">
                 <a:latin typeface="Garamond" charset="0"/>
               </a:rPr>
-              <a:t>10/15/2019</a:t>
+              <a:t>10/16/2019</a:t>
             </a:fld>
             <a:endParaRPr lang="en-US" sz="1200">
               <a:latin typeface="Garamond" charset="0"/>
@@ -10248,14 +10301,14 @@
           <a:ln/>
           <a:extLst>
             <a:ext uri="{909E8E84-426E-40dd-AFC4-6F175D3DCCD1}">
-              <a14:hiddenFill xmlns="" xmlns:a14="http://schemas.microsoft.com/office/drawing/2010/main">
+              <a14:hiddenFill xmlns:a14="http://schemas.microsoft.com/office/drawing/2010/main" xmlns="">
                 <a:solidFill>
                   <a:srgbClr val="FFFFFF"/>
                 </a:solidFill>
               </a14:hiddenFill>
             </a:ext>
             <a:ext uri="{91240B29-F687-4f45-9708-019B960494DF}">
-              <a14:hiddenLine xmlns="" xmlns:a14="http://schemas.microsoft.com/office/drawing/2010/main" w="9525">
+              <a14:hiddenLine xmlns:a14="http://schemas.microsoft.com/office/drawing/2010/main" xmlns="" w="9525">
                 <a:solidFill>
                   <a:srgbClr val="000000"/>
                 </a:solidFill>
@@ -10461,7 +10514,7 @@
             </a:pPr>
             <a:r>
               <a:rPr lang="en-US" dirty="0"/>
-              <a:t>MOV	CL, 5</a:t>
+              <a:t>MOV	CX, 5</a:t>
             </a:r>
           </a:p>
           <a:p>
@@ -10483,7 +10536,7 @@
             </a:pPr>
             <a:r>
               <a:rPr lang="en-US" dirty="0"/>
-              <a:t>     DEC	CL</a:t>
+              <a:t>     DEC	CX</a:t>
             </a:r>
           </a:p>
           <a:p>
@@ -10546,7 +10599,15 @@
             </a:pPr>
             <a:r>
               <a:rPr lang="en-US" dirty="0"/>
-              <a:t>MOV	CL, 5</a:t>
+              <a:t>MOV</a:t>
+            </a:r>
+            <a:r>
+              <a:rPr lang="en-US"/>
+              <a:t>	CX, </a:t>
+            </a:r>
+            <a:r>
+              <a:rPr lang="en-US" dirty="0"/>
+              <a:t>5</a:t>
             </a:r>
           </a:p>
           <a:p>
@@ -10596,14 +10657,14 @@
           <a:ln/>
           <a:extLst>
             <a:ext uri="{909E8E84-426E-40dd-AFC4-6F175D3DCCD1}">
-              <a14:hiddenFill xmlns="" xmlns:a14="http://schemas.microsoft.com/office/drawing/2010/main">
+              <a14:hiddenFill xmlns:a14="http://schemas.microsoft.com/office/drawing/2010/main" xmlns="">
                 <a:solidFill>
                   <a:srgbClr val="FFFFFF"/>
                 </a:solidFill>
               </a14:hiddenFill>
             </a:ext>
             <a:ext uri="{91240B29-F687-4f45-9708-019B960494DF}">
-              <a14:hiddenLine xmlns="" xmlns:a14="http://schemas.microsoft.com/office/drawing/2010/main" w="9525">
+              <a14:hiddenLine xmlns:a14="http://schemas.microsoft.com/office/drawing/2010/main" xmlns="" w="9525">
                 <a:solidFill>
                   <a:srgbClr val="000000"/>
                 </a:solidFill>
@@ -10709,7 +10770,7 @@
               <a:rPr lang="en-US" sz="1200" smtClean="0">
                 <a:latin typeface="Garamond" charset="0"/>
               </a:rPr>
-              <a:t>10/15/2019</a:t>
+              <a:t>10/16/2019</a:t>
             </a:fld>
             <a:endParaRPr lang="en-US" sz="1200">
               <a:latin typeface="Garamond" charset="0"/>
@@ -10757,14 +10818,14 @@
           <a:ln/>
           <a:extLst>
             <a:ext uri="{909E8E84-426E-40dd-AFC4-6F175D3DCCD1}">
-              <a14:hiddenFill xmlns="" xmlns:a14="http://schemas.microsoft.com/office/drawing/2010/main">
+              <a14:hiddenFill xmlns:a14="http://schemas.microsoft.com/office/drawing/2010/main" xmlns="">
                 <a:solidFill>
                   <a:srgbClr val="FFFFFF"/>
                 </a:solidFill>
               </a14:hiddenFill>
             </a:ext>
             <a:ext uri="{91240B29-F687-4f45-9708-019B960494DF}">
-              <a14:hiddenLine xmlns="" xmlns:a14="http://schemas.microsoft.com/office/drawing/2010/main" w="9525">
+              <a14:hiddenLine xmlns:a14="http://schemas.microsoft.com/office/drawing/2010/main" xmlns="" w="9525">
                 <a:solidFill>
                   <a:srgbClr val="000000"/>
                 </a:solidFill>
@@ -11243,14 +11304,14 @@
           <a:ln/>
           <a:extLst>
             <a:ext uri="{909E8E84-426E-40dd-AFC4-6F175D3DCCD1}">
-              <a14:hiddenFill xmlns="" xmlns:a14="http://schemas.microsoft.com/office/drawing/2010/main">
+              <a14:hiddenFill xmlns:a14="http://schemas.microsoft.com/office/drawing/2010/main" xmlns="">
                 <a:solidFill>
                   <a:srgbClr val="FFFFFF"/>
                 </a:solidFill>
               </a14:hiddenFill>
             </a:ext>
             <a:ext uri="{91240B29-F687-4f45-9708-019B960494DF}">
-              <a14:hiddenLine xmlns="" xmlns:a14="http://schemas.microsoft.com/office/drawing/2010/main" w="9525">
+              <a14:hiddenLine xmlns:a14="http://schemas.microsoft.com/office/drawing/2010/main" xmlns="" w="9525">
                 <a:solidFill>
                   <a:srgbClr val="000000"/>
                 </a:solidFill>
@@ -11355,7 +11416,7 @@
             <a:pPr eaLnBrk="0" hangingPunct="0"/>
             <a:fld id="{FABBF05B-F316-4B5D-B39C-644B640554E1}" type="datetime1">
               <a:rPr lang="en-US" sz="1200" smtClean="0"/>
-              <a:t>10/15/2019</a:t>
+              <a:t>10/16/2019</a:t>
             </a:fld>
             <a:endParaRPr lang="en-US" sz="1200"/>
           </a:p>
@@ -11402,14 +11463,14 @@
           <a:ln/>
           <a:extLst>
             <a:ext uri="{909E8E84-426E-40dd-AFC4-6F175D3DCCD1}">
-              <a14:hiddenFill xmlns="" xmlns:a14="http://schemas.microsoft.com/office/drawing/2010/main">
+              <a14:hiddenFill xmlns:a14="http://schemas.microsoft.com/office/drawing/2010/main" xmlns="">
                 <a:solidFill>
                   <a:srgbClr val="FFFFFF"/>
                 </a:solidFill>
               </a14:hiddenFill>
             </a:ext>
             <a:ext uri="{91240B29-F687-4f45-9708-019B960494DF}">
-              <a14:hiddenLine xmlns="" xmlns:a14="http://schemas.microsoft.com/office/drawing/2010/main" w="9525">
+              <a14:hiddenLine xmlns:a14="http://schemas.microsoft.com/office/drawing/2010/main" xmlns="" w="9525">
                 <a:solidFill>
                   <a:srgbClr val="000000"/>
                 </a:solidFill>
@@ -11765,14 +11826,14 @@
           <a:ln/>
           <a:extLst>
             <a:ext uri="{909E8E84-426E-40dd-AFC4-6F175D3DCCD1}">
-              <a14:hiddenFill xmlns="" xmlns:a14="http://schemas.microsoft.com/office/drawing/2010/main">
+              <a14:hiddenFill xmlns:a14="http://schemas.microsoft.com/office/drawing/2010/main" xmlns="">
                 <a:solidFill>
                   <a:srgbClr val="FFFFFF"/>
                 </a:solidFill>
               </a14:hiddenFill>
             </a:ext>
             <a:ext uri="{91240B29-F687-4f45-9708-019B960494DF}">
-              <a14:hiddenLine xmlns="" xmlns:a14="http://schemas.microsoft.com/office/drawing/2010/main" w="9525">
+              <a14:hiddenLine xmlns:a14="http://schemas.microsoft.com/office/drawing/2010/main" xmlns="" w="9525">
                 <a:solidFill>
                   <a:srgbClr val="000000"/>
                 </a:solidFill>
@@ -11878,7 +11939,7 @@
               <a:rPr lang="en-US" sz="1200" smtClean="0">
                 <a:latin typeface="Garamond" charset="0"/>
               </a:rPr>
-              <a:t>10/15/2019</a:t>
+              <a:t>10/16/2019</a:t>
             </a:fld>
             <a:endParaRPr lang="en-US" sz="1200">
               <a:latin typeface="Garamond" charset="0"/>
@@ -11926,14 +11987,14 @@
           <a:ln/>
           <a:extLst>
             <a:ext uri="{909E8E84-426E-40dd-AFC4-6F175D3DCCD1}">
-              <a14:hiddenFill xmlns="" xmlns:a14="http://schemas.microsoft.com/office/drawing/2010/main">
+              <a14:hiddenFill xmlns:a14="http://schemas.microsoft.com/office/drawing/2010/main" xmlns="">
                 <a:solidFill>
                   <a:srgbClr val="FFFFFF"/>
                 </a:solidFill>
               </a14:hiddenFill>
             </a:ext>
             <a:ext uri="{91240B29-F687-4f45-9708-019B960494DF}">
-              <a14:hiddenLine xmlns="" xmlns:a14="http://schemas.microsoft.com/office/drawing/2010/main" w="9525">
+              <a14:hiddenLine xmlns:a14="http://schemas.microsoft.com/office/drawing/2010/main" xmlns="" w="9525">
                 <a:solidFill>
                   <a:srgbClr val="000000"/>
                 </a:solidFill>
@@ -12171,14 +12232,14 @@
           <a:ln/>
           <a:extLst>
             <a:ext uri="{909E8E84-426E-40dd-AFC4-6F175D3DCCD1}">
-              <a14:hiddenFill xmlns="" xmlns:a14="http://schemas.microsoft.com/office/drawing/2010/main">
+              <a14:hiddenFill xmlns:a14="http://schemas.microsoft.com/office/drawing/2010/main" xmlns="">
                 <a:solidFill>
                   <a:srgbClr val="FFFFFF"/>
                 </a:solidFill>
               </a14:hiddenFill>
             </a:ext>
             <a:ext uri="{91240B29-F687-4f45-9708-019B960494DF}">
-              <a14:hiddenLine xmlns="" xmlns:a14="http://schemas.microsoft.com/office/drawing/2010/main" w="9525">
+              <a14:hiddenLine xmlns:a14="http://schemas.microsoft.com/office/drawing/2010/main" xmlns="" w="9525">
                 <a:solidFill>
                   <a:srgbClr val="000000"/>
                 </a:solidFill>
@@ -12284,7 +12345,7 @@
               <a:rPr lang="en-US" sz="1200" smtClean="0">
                 <a:latin typeface="Garamond" charset="0"/>
               </a:rPr>
-              <a:t>10/15/2019</a:t>
+              <a:t>10/16/2019</a:t>
             </a:fld>
             <a:endParaRPr lang="en-US" sz="1200">
               <a:latin typeface="Garamond" charset="0"/>
@@ -12332,14 +12393,14 @@
           <a:ln/>
           <a:extLst>
             <a:ext uri="{909E8E84-426E-40dd-AFC4-6F175D3DCCD1}">
-              <a14:hiddenFill xmlns="" xmlns:a14="http://schemas.microsoft.com/office/drawing/2010/main">
+              <a14:hiddenFill xmlns:a14="http://schemas.microsoft.com/office/drawing/2010/main" xmlns="">
                 <a:solidFill>
                   <a:srgbClr val="FFFFFF"/>
                 </a:solidFill>
               </a14:hiddenFill>
             </a:ext>
             <a:ext uri="{91240B29-F687-4f45-9708-019B960494DF}">
-              <a14:hiddenLine xmlns="" xmlns:a14="http://schemas.microsoft.com/office/drawing/2010/main" w="9525">
+              <a14:hiddenLine xmlns:a14="http://schemas.microsoft.com/office/drawing/2010/main" xmlns="" w="9525">
                 <a:solidFill>
                   <a:srgbClr val="000000"/>
                 </a:solidFill>
@@ -12599,14 +12660,14 @@
           <a:ln/>
           <a:extLst>
             <a:ext uri="{909E8E84-426E-40dd-AFC4-6F175D3DCCD1}">
-              <a14:hiddenFill xmlns="" xmlns:a14="http://schemas.microsoft.com/office/drawing/2010/main">
+              <a14:hiddenFill xmlns:a14="http://schemas.microsoft.com/office/drawing/2010/main" xmlns="">
                 <a:solidFill>
                   <a:srgbClr val="FFFFFF"/>
                 </a:solidFill>
               </a14:hiddenFill>
             </a:ext>
             <a:ext uri="{91240B29-F687-4f45-9708-019B960494DF}">
-              <a14:hiddenLine xmlns="" xmlns:a14="http://schemas.microsoft.com/office/drawing/2010/main" w="9525">
+              <a14:hiddenLine xmlns:a14="http://schemas.microsoft.com/office/drawing/2010/main" xmlns="" w="9525">
                 <a:solidFill>
                   <a:srgbClr val="000000"/>
                 </a:solidFill>
@@ -12712,7 +12773,7 @@
               <a:rPr lang="en-US" sz="1200" smtClean="0">
                 <a:latin typeface="Garamond" charset="0"/>
               </a:rPr>
-              <a:t>10/15/2019</a:t>
+              <a:t>10/16/2019</a:t>
             </a:fld>
             <a:endParaRPr lang="en-US" sz="1200">
               <a:latin typeface="Garamond" charset="0"/>
@@ -12760,14 +12821,14 @@
           <a:ln/>
           <a:extLst>
             <a:ext uri="{909E8E84-426E-40dd-AFC4-6F175D3DCCD1}">
-              <a14:hiddenFill xmlns="" xmlns:a14="http://schemas.microsoft.com/office/drawing/2010/main">
+              <a14:hiddenFill xmlns:a14="http://schemas.microsoft.com/office/drawing/2010/main" xmlns="">
                 <a:solidFill>
                   <a:srgbClr val="FFFFFF"/>
                 </a:solidFill>
               </a14:hiddenFill>
             </a:ext>
             <a:ext uri="{91240B29-F687-4f45-9708-019B960494DF}">
-              <a14:hiddenLine xmlns="" xmlns:a14="http://schemas.microsoft.com/office/drawing/2010/main" w="9525">
+              <a14:hiddenLine xmlns:a14="http://schemas.microsoft.com/office/drawing/2010/main" xmlns="" w="9525">
                 <a:solidFill>
                   <a:srgbClr val="000000"/>
                 </a:solidFill>
@@ -13187,14 +13248,14 @@
           <a:ln/>
           <a:extLst>
             <a:ext uri="{909E8E84-426E-40dd-AFC4-6F175D3DCCD1}">
-              <a14:hiddenFill xmlns="" xmlns:a14="http://schemas.microsoft.com/office/drawing/2010/main">
+              <a14:hiddenFill xmlns:a14="http://schemas.microsoft.com/office/drawing/2010/main" xmlns="">
                 <a:solidFill>
                   <a:srgbClr val="FFFFFF"/>
                 </a:solidFill>
               </a14:hiddenFill>
             </a:ext>
             <a:ext uri="{91240B29-F687-4f45-9708-019B960494DF}">
-              <a14:hiddenLine xmlns="" xmlns:a14="http://schemas.microsoft.com/office/drawing/2010/main" w="9525">
+              <a14:hiddenLine xmlns:a14="http://schemas.microsoft.com/office/drawing/2010/main" xmlns="" w="9525">
                 <a:solidFill>
                   <a:srgbClr val="000000"/>
                 </a:solidFill>
@@ -13321,7 +13382,7 @@
               <a:rPr lang="en-US" sz="1200" smtClean="0">
                 <a:latin typeface="Garamond" charset="0"/>
               </a:rPr>
-              <a:t>10/15/2019</a:t>
+              <a:t>10/16/2019</a:t>
             </a:fld>
             <a:endParaRPr lang="en-US" sz="1200">
               <a:latin typeface="Garamond" charset="0"/>
@@ -13369,14 +13430,14 @@
           <a:ln/>
           <a:extLst>
             <a:ext uri="{909E8E84-426E-40dd-AFC4-6F175D3DCCD1}">
-              <a14:hiddenFill xmlns="" xmlns:a14="http://schemas.microsoft.com/office/drawing/2010/main">
+              <a14:hiddenFill xmlns:a14="http://schemas.microsoft.com/office/drawing/2010/main" xmlns="">
                 <a:solidFill>
                   <a:srgbClr val="FFFFFF"/>
                 </a:solidFill>
               </a14:hiddenFill>
             </a:ext>
             <a:ext uri="{91240B29-F687-4f45-9708-019B960494DF}">
-              <a14:hiddenLine xmlns="" xmlns:a14="http://schemas.microsoft.com/office/drawing/2010/main" w="9525">
+              <a14:hiddenLine xmlns:a14="http://schemas.microsoft.com/office/drawing/2010/main" xmlns="" w="9525">
                 <a:solidFill>
                   <a:srgbClr val="000000"/>
                 </a:solidFill>
@@ -14095,14 +14156,14 @@
           <a:ln/>
           <a:extLst>
             <a:ext uri="{909E8E84-426E-40dd-AFC4-6F175D3DCCD1}">
-              <a14:hiddenFill xmlns="" xmlns:a14="http://schemas.microsoft.com/office/drawing/2010/main">
+              <a14:hiddenFill xmlns:a14="http://schemas.microsoft.com/office/drawing/2010/main" xmlns="">
                 <a:solidFill>
                   <a:srgbClr val="FFFFFF"/>
                 </a:solidFill>
               </a14:hiddenFill>
             </a:ext>
             <a:ext uri="{91240B29-F687-4f45-9708-019B960494DF}">
-              <a14:hiddenLine xmlns="" xmlns:a14="http://schemas.microsoft.com/office/drawing/2010/main" w="9525">
+              <a14:hiddenLine xmlns:a14="http://schemas.microsoft.com/office/drawing/2010/main" xmlns="" w="9525">
                 <a:solidFill>
                   <a:srgbClr val="000000"/>
                 </a:solidFill>
@@ -14229,7 +14290,7 @@
               <a:rPr lang="en-US" sz="1200" smtClean="0">
                 <a:latin typeface="Garamond" charset="0"/>
               </a:rPr>
-              <a:t>10/15/2019</a:t>
+              <a:t>10/16/2019</a:t>
             </a:fld>
             <a:endParaRPr lang="en-US" sz="1200">
               <a:latin typeface="Garamond" charset="0"/>
@@ -14277,14 +14338,14 @@
           <a:ln/>
           <a:extLst>
             <a:ext uri="{909E8E84-426E-40dd-AFC4-6F175D3DCCD1}">
-              <a14:hiddenFill xmlns="" xmlns:a14="http://schemas.microsoft.com/office/drawing/2010/main">
+              <a14:hiddenFill xmlns:a14="http://schemas.microsoft.com/office/drawing/2010/main" xmlns="">
                 <a:solidFill>
                   <a:srgbClr val="FFFFFF"/>
                 </a:solidFill>
               </a14:hiddenFill>
             </a:ext>
             <a:ext uri="{91240B29-F687-4f45-9708-019B960494DF}">
-              <a14:hiddenLine xmlns="" xmlns:a14="http://schemas.microsoft.com/office/drawing/2010/main" w="9525">
+              <a14:hiddenLine xmlns:a14="http://schemas.microsoft.com/office/drawing/2010/main" xmlns="" w="9525">
                 <a:solidFill>
                   <a:srgbClr val="000000"/>
                 </a:solidFill>
@@ -14606,14 +14667,14 @@
           <a:ln/>
           <a:extLst>
             <a:ext uri="{909E8E84-426E-40dd-AFC4-6F175D3DCCD1}">
-              <a14:hiddenFill xmlns="" xmlns:a14="http://schemas.microsoft.com/office/drawing/2010/main">
+              <a14:hiddenFill xmlns:a14="http://schemas.microsoft.com/office/drawing/2010/main" xmlns="">
                 <a:solidFill>
                   <a:srgbClr val="FFFFFF"/>
                 </a:solidFill>
               </a14:hiddenFill>
             </a:ext>
             <a:ext uri="{91240B29-F687-4f45-9708-019B960494DF}">
-              <a14:hiddenLine xmlns="" xmlns:a14="http://schemas.microsoft.com/office/drawing/2010/main" w="9525">
+              <a14:hiddenLine xmlns:a14="http://schemas.microsoft.com/office/drawing/2010/main" xmlns="" w="9525">
                 <a:solidFill>
                   <a:srgbClr val="000000"/>
                 </a:solidFill>
@@ -14719,7 +14780,7 @@
               <a:rPr lang="en-US" sz="1200" smtClean="0">
                 <a:latin typeface="Garamond" charset="0"/>
               </a:rPr>
-              <a:t>10/15/2019</a:t>
+              <a:t>10/16/2019</a:t>
             </a:fld>
             <a:endParaRPr lang="en-US" sz="1200">
               <a:latin typeface="Garamond" charset="0"/>
@@ -14768,14 +14829,14 @@
           <a:ln/>
           <a:extLst>
             <a:ext uri="{909E8E84-426E-40dd-AFC4-6F175D3DCCD1}">
-              <a14:hiddenFill xmlns="" xmlns:a14="http://schemas.microsoft.com/office/drawing/2010/main">
+              <a14:hiddenFill xmlns:a14="http://schemas.microsoft.com/office/drawing/2010/main" xmlns="">
                 <a:solidFill>
                   <a:srgbClr val="FFFFFF"/>
                 </a:solidFill>
               </a14:hiddenFill>
             </a:ext>
             <a:ext uri="{91240B29-F687-4f45-9708-019B960494DF}">
-              <a14:hiddenLine xmlns="" xmlns:a14="http://schemas.microsoft.com/office/drawing/2010/main" w="9525">
+              <a14:hiddenLine xmlns:a14="http://schemas.microsoft.com/office/drawing/2010/main" xmlns="" w="9525">
                 <a:solidFill>
                   <a:srgbClr val="000000"/>
                 </a:solidFill>
@@ -15406,14 +15467,14 @@
           <a:ln/>
           <a:extLst>
             <a:ext uri="{909E8E84-426E-40dd-AFC4-6F175D3DCCD1}">
-              <a14:hiddenFill xmlns="" xmlns:a14="http://schemas.microsoft.com/office/drawing/2010/main">
+              <a14:hiddenFill xmlns:a14="http://schemas.microsoft.com/office/drawing/2010/main" xmlns="">
                 <a:solidFill>
                   <a:srgbClr val="FFFFFF"/>
                 </a:solidFill>
               </a14:hiddenFill>
             </a:ext>
             <a:ext uri="{91240B29-F687-4f45-9708-019B960494DF}">
-              <a14:hiddenLine xmlns="" xmlns:a14="http://schemas.microsoft.com/office/drawing/2010/main" w="9525">
+              <a14:hiddenLine xmlns:a14="http://schemas.microsoft.com/office/drawing/2010/main" xmlns="" w="9525">
                 <a:solidFill>
                   <a:srgbClr val="000000"/>
                 </a:solidFill>
@@ -15540,7 +15601,7 @@
               <a:rPr lang="en-US" sz="1200" smtClean="0">
                 <a:latin typeface="Garamond" charset="0"/>
               </a:rPr>
-              <a:t>10/15/2019</a:t>
+              <a:t>10/16/2019</a:t>
             </a:fld>
             <a:endParaRPr lang="en-US" sz="1200">
               <a:latin typeface="Garamond" charset="0"/>
@@ -15588,14 +15649,14 @@
           <a:ln/>
           <a:extLst>
             <a:ext uri="{909E8E84-426E-40dd-AFC4-6F175D3DCCD1}">
-              <a14:hiddenFill xmlns="" xmlns:a14="http://schemas.microsoft.com/office/drawing/2010/main">
+              <a14:hiddenFill xmlns:a14="http://schemas.microsoft.com/office/drawing/2010/main" xmlns="">
                 <a:solidFill>
                   <a:srgbClr val="FFFFFF"/>
                 </a:solidFill>
               </a14:hiddenFill>
             </a:ext>
             <a:ext uri="{91240B29-F687-4f45-9708-019B960494DF}">
-              <a14:hiddenLine xmlns="" xmlns:a14="http://schemas.microsoft.com/office/drawing/2010/main" w="9525">
+              <a14:hiddenLine xmlns:a14="http://schemas.microsoft.com/office/drawing/2010/main" xmlns="" w="9525">
                 <a:solidFill>
                   <a:srgbClr val="000000"/>
                 </a:solidFill>
@@ -15993,14 +16054,14 @@
           <a:ln/>
           <a:extLst>
             <a:ext uri="{909E8E84-426E-40dd-AFC4-6F175D3DCCD1}">
-              <a14:hiddenFill xmlns="" xmlns:a14="http://schemas.microsoft.com/office/drawing/2010/main">
+              <a14:hiddenFill xmlns:a14="http://schemas.microsoft.com/office/drawing/2010/main" xmlns="">
                 <a:solidFill>
                   <a:srgbClr val="FFFFFF"/>
                 </a:solidFill>
               </a14:hiddenFill>
             </a:ext>
             <a:ext uri="{91240B29-F687-4f45-9708-019B960494DF}">
-              <a14:hiddenLine xmlns="" xmlns:a14="http://schemas.microsoft.com/office/drawing/2010/main" w="9525">
+              <a14:hiddenLine xmlns:a14="http://schemas.microsoft.com/office/drawing/2010/main" xmlns="" w="9525">
                 <a:solidFill>
                   <a:srgbClr val="000000"/>
                 </a:solidFill>
@@ -16106,7 +16167,7 @@
               <a:rPr lang="en-US" sz="1200" smtClean="0">
                 <a:latin typeface="Garamond" charset="0"/>
               </a:rPr>
-              <a:t>10/15/2019</a:t>
+              <a:t>10/16/2019</a:t>
             </a:fld>
             <a:endParaRPr lang="en-US" sz="1200">
               <a:latin typeface="Garamond" charset="0"/>
@@ -16154,14 +16215,14 @@
           <a:ln/>
           <a:extLst>
             <a:ext uri="{909E8E84-426E-40dd-AFC4-6F175D3DCCD1}">
-              <a14:hiddenFill xmlns="" xmlns:a14="http://schemas.microsoft.com/office/drawing/2010/main">
+              <a14:hiddenFill xmlns:a14="http://schemas.microsoft.com/office/drawing/2010/main" xmlns="">
                 <a:solidFill>
                   <a:srgbClr val="FFFFFF"/>
                 </a:solidFill>
               </a14:hiddenFill>
             </a:ext>
             <a:ext uri="{91240B29-F687-4f45-9708-019B960494DF}">
-              <a14:hiddenLine xmlns="" xmlns:a14="http://schemas.microsoft.com/office/drawing/2010/main" w="9525">
+              <a14:hiddenLine xmlns:a14="http://schemas.microsoft.com/office/drawing/2010/main" xmlns="" w="9525">
                 <a:solidFill>
                   <a:srgbClr val="000000"/>
                 </a:solidFill>
@@ -16371,14 +16432,14 @@
           <a:ln/>
           <a:extLst>
             <a:ext uri="{909E8E84-426E-40dd-AFC4-6F175D3DCCD1}">
-              <a14:hiddenFill xmlns="" xmlns:a14="http://schemas.microsoft.com/office/drawing/2010/main">
+              <a14:hiddenFill xmlns:a14="http://schemas.microsoft.com/office/drawing/2010/main" xmlns="">
                 <a:solidFill>
                   <a:srgbClr val="FFFFFF"/>
                 </a:solidFill>
               </a14:hiddenFill>
             </a:ext>
             <a:ext uri="{91240B29-F687-4f45-9708-019B960494DF}">
-              <a14:hiddenLine xmlns="" xmlns:a14="http://schemas.microsoft.com/office/drawing/2010/main" w="9525">
+              <a14:hiddenLine xmlns:a14="http://schemas.microsoft.com/office/drawing/2010/main" xmlns="" w="9525">
                 <a:solidFill>
                   <a:srgbClr val="000000"/>
                 </a:solidFill>
@@ -16484,7 +16545,7 @@
               <a:rPr lang="en-US" sz="1200" smtClean="0">
                 <a:latin typeface="Garamond" charset="0"/>
               </a:rPr>
-              <a:t>10/15/2019</a:t>
+              <a:t>10/16/2019</a:t>
             </a:fld>
             <a:endParaRPr lang="en-US" sz="1200">
               <a:latin typeface="Garamond" charset="0"/>
@@ -16532,14 +16593,14 @@
           <a:ln/>
           <a:extLst>
             <a:ext uri="{909E8E84-426E-40dd-AFC4-6F175D3DCCD1}">
-              <a14:hiddenFill xmlns="" xmlns:a14="http://schemas.microsoft.com/office/drawing/2010/main">
+              <a14:hiddenFill xmlns:a14="http://schemas.microsoft.com/office/drawing/2010/main" xmlns="">
                 <a:solidFill>
                   <a:srgbClr val="FFFFFF"/>
                 </a:solidFill>
               </a14:hiddenFill>
             </a:ext>
             <a:ext uri="{91240B29-F687-4f45-9708-019B960494DF}">
-              <a14:hiddenLine xmlns="" xmlns:a14="http://schemas.microsoft.com/office/drawing/2010/main" w="9525">
+              <a14:hiddenLine xmlns:a14="http://schemas.microsoft.com/office/drawing/2010/main" xmlns="" w="9525">
                 <a:solidFill>
                   <a:srgbClr val="000000"/>
                 </a:solidFill>
@@ -16690,14 +16751,14 @@
           <a:effectLst/>
           <a:extLst>
             <a:ext uri="{909E8E84-426E-40dd-AFC4-6F175D3DCCD1}">
-              <a14:hiddenFill xmlns="" xmlns:a14="http://schemas.microsoft.com/office/drawing/2010/main">
+              <a14:hiddenFill xmlns:a14="http://schemas.microsoft.com/office/drawing/2010/main" xmlns="">
                 <a:solidFill>
                   <a:schemeClr val="accent1"/>
                 </a:solidFill>
               </a14:hiddenFill>
             </a:ext>
             <a:ext uri="{91240B29-F687-4f45-9708-019B960494DF}">
-              <a14:hiddenLine xmlns="" xmlns:a14="http://schemas.microsoft.com/office/drawing/2010/main" w="9525">
+              <a14:hiddenLine xmlns:a14="http://schemas.microsoft.com/office/drawing/2010/main" xmlns="" w="9525">
                 <a:solidFill>
                   <a:schemeClr val="tx1"/>
                 </a:solidFill>
@@ -16707,7 +16768,7 @@
               </a14:hiddenLine>
             </a:ext>
             <a:ext uri="{AF507438-7753-43e0-B8FC-AC1667EBCBE1}">
-              <a14:hiddenEffects xmlns="" xmlns:a14="http://schemas.microsoft.com/office/drawing/2010/main">
+              <a14:hiddenEffects xmlns:a14="http://schemas.microsoft.com/office/drawing/2010/main" xmlns="">
                 <a:effectLst>
                   <a:outerShdw blurRad="63500" dist="38099" dir="2700000" algn="ctr" rotWithShape="0">
                     <a:schemeClr val="bg2">

</xml_diff>